<commit_message>
correçao do pitch versao final
</commit_message>
<xml_diff>
--- a/pitch.pptx
+++ b/pitch.pptx
@@ -3390,10 +3390,10 @@
       </p:sp>
       <p:sp>
         <p:nvSpPr>
-          <p:cNvPr id="4" name="Oval 3">
-            <a:extLst>
-              <a:ext uri="{FF2B5EF4-FFF2-40B4-BE49-F238E27FC236}">
-                <a16:creationId xmlns:a16="http://schemas.microsoft.com/office/drawing/2014/main" id="{1032CA94-D3AB-49C2-8EE0-F7F8B8488BCA}"/>
+          <p:cNvPr id="5" name="Rectangle 4">
+            <a:extLst>
+              <a:ext uri="{FF2B5EF4-FFF2-40B4-BE49-F238E27FC236}">
+                <a16:creationId xmlns:a16="http://schemas.microsoft.com/office/drawing/2014/main" id="{24155989-1771-47A5-8151-6F6F70AA8770}"/>
               </a:ext>
             </a:extLst>
           </p:cNvPr>
@@ -3402,10 +3402,10 @@
         </p:nvSpPr>
         <p:spPr>
           <a:xfrm>
-            <a:off x="9505244" y="1986844"/>
-            <a:ext cx="1851378" cy="1738489"/>
+            <a:off x="564445" y="3568170"/>
+            <a:ext cx="2528711" cy="2167467"/>
           </a:xfrm>
-          <a:prstGeom prst="ellipse">
+          <a:prstGeom prst="rect">
             <a:avLst/>
           </a:prstGeom>
         </p:spPr>
@@ -3430,19 +3430,7 @@
           <a:lstStyle/>
           <a:p>
             <a:pPr algn="ctr"/>
-            <a:endParaRPr lang="en-US">
-              <a:ln w="0"/>
-              <a:solidFill>
-                <a:schemeClr val="tx1"/>
-              </a:solidFill>
-              <a:effectLst>
-                <a:outerShdw blurRad="38100" dist="19050" dir="2700000" algn="tl" rotWithShape="0">
-                  <a:schemeClr val="dk1">
-                    <a:alpha val="40000"/>
-                  </a:schemeClr>
-                </a:outerShdw>
-              </a:effectLst>
-            </a:endParaRPr>
+            <a:endParaRPr lang="en-US"/>
           </a:p>
         </p:txBody>
       </p:sp>

</xml_diff>